<commit_message>
Update Liner Regression Model.pptx
</commit_message>
<xml_diff>
--- a/Liner Regression Model.pptx
+++ b/Liner Regression Model.pptx
@@ -6,11 +6,12 @@
   </p:sldMasterIdLst>
   <p:sldIdLst>
     <p:sldId id="256" r:id="rId2"/>
-    <p:sldId id="257" r:id="rId3"/>
-    <p:sldId id="258" r:id="rId4"/>
-    <p:sldId id="259" r:id="rId5"/>
-    <p:sldId id="260" r:id="rId6"/>
-    <p:sldId id="261" r:id="rId7"/>
+    <p:sldId id="262" r:id="rId3"/>
+    <p:sldId id="257" r:id="rId4"/>
+    <p:sldId id="258" r:id="rId5"/>
+    <p:sldId id="259" r:id="rId6"/>
+    <p:sldId id="260" r:id="rId7"/>
+    <p:sldId id="261" r:id="rId8"/>
   </p:sldIdLst>
   <p:sldSz cx="12192000" cy="6858000"/>
   <p:notesSz cx="6858000" cy="9144000"/>
@@ -109,7 +110,49 @@
       </a:defRPr>
     </a:lvl9pPr>
   </p:defaultTextStyle>
+  <p:extLst>
+    <p:ext uri="{EFAFB233-063F-42B5-8137-9DF3F51BA10A}">
+      <p15:sldGuideLst xmlns:p15="http://schemas.microsoft.com/office/powerpoint/2012/main"/>
+    </p:ext>
+  </p:extLst>
 </p:presentation>
+</file>
+
+<file path=ppt/changesInfos/changesInfo1.xml><?xml version="1.0" encoding="utf-8"?>
+<pc:chgInfo xmlns:a="http://schemas.openxmlformats.org/drawingml/2006/main" xmlns:r="http://schemas.openxmlformats.org/officeDocument/2006/relationships" xmlns:ac="http://schemas.microsoft.com/office/drawing/2013/main/command" xmlns:pc="http://schemas.microsoft.com/office/powerpoint/2013/main/command">
+  <pc:docChgLst>
+    <pc:chgData name="Yash Ankleshwariya" userId="7e9b5a68d9267a2f" providerId="LiveId" clId="{1EA2D5F2-87BF-4E6F-9AB7-080CFD4B1421}"/>
+    <pc:docChg chg="addSld modSld">
+      <pc:chgData name="Yash Ankleshwariya" userId="7e9b5a68d9267a2f" providerId="LiveId" clId="{1EA2D5F2-87BF-4E6F-9AB7-080CFD4B1421}" dt="2023-06-15T11:31:08.572" v="2"/>
+      <pc:docMkLst>
+        <pc:docMk/>
+      </pc:docMkLst>
+      <pc:sldChg chg="modSp new mod">
+        <pc:chgData name="Yash Ankleshwariya" userId="7e9b5a68d9267a2f" providerId="LiveId" clId="{1EA2D5F2-87BF-4E6F-9AB7-080CFD4B1421}" dt="2023-06-15T11:31:08.572" v="2"/>
+        <pc:sldMkLst>
+          <pc:docMk/>
+          <pc:sldMk cId="3422778736" sldId="262"/>
+        </pc:sldMkLst>
+        <pc:spChg chg="mod">
+          <ac:chgData name="Yash Ankleshwariya" userId="7e9b5a68d9267a2f" providerId="LiveId" clId="{1EA2D5F2-87BF-4E6F-9AB7-080CFD4B1421}" dt="2023-06-15T11:31:08.572" v="2"/>
+          <ac:spMkLst>
+            <pc:docMk/>
+            <pc:sldMk cId="3422778736" sldId="262"/>
+            <ac:spMk id="2" creationId="{FC77A7C7-B2FF-EBF7-632C-663A8107204B}"/>
+          </ac:spMkLst>
+        </pc:spChg>
+        <pc:spChg chg="mod">
+          <ac:chgData name="Yash Ankleshwariya" userId="7e9b5a68d9267a2f" providerId="LiveId" clId="{1EA2D5F2-87BF-4E6F-9AB7-080CFD4B1421}" dt="2023-06-15T11:31:03.920" v="1"/>
+          <ac:spMkLst>
+            <pc:docMk/>
+            <pc:sldMk cId="3422778736" sldId="262"/>
+            <ac:spMk id="3" creationId="{8EE6C288-01AC-2561-94A5-9A597F23FCA9}"/>
+          </ac:spMkLst>
+        </pc:spChg>
+      </pc:sldChg>
+    </pc:docChg>
+  </pc:docChgLst>
+</pc:chgInfo>
 </file>
 
 <file path=ppt/slideLayouts/slideLayout1.xml><?xml version="1.0" encoding="utf-8"?>
@@ -261,7 +304,7 @@
           <a:p>
             <a:fld id="{30317E40-9B5E-4799-9011-56979081E450}" type="datetimeFigureOut">
               <a:rPr lang="en-IN" smtClean="0"/>
-              <a:t>30-04-2023</a:t>
+              <a:t>15-06-2023</a:t>
             </a:fld>
             <a:endParaRPr lang="en-IN"/>
           </a:p>
@@ -461,7 +504,7 @@
           <a:p>
             <a:fld id="{30317E40-9B5E-4799-9011-56979081E450}" type="datetimeFigureOut">
               <a:rPr lang="en-IN" smtClean="0"/>
-              <a:t>30-04-2023</a:t>
+              <a:t>15-06-2023</a:t>
             </a:fld>
             <a:endParaRPr lang="en-IN"/>
           </a:p>
@@ -671,7 +714,7 @@
           <a:p>
             <a:fld id="{30317E40-9B5E-4799-9011-56979081E450}" type="datetimeFigureOut">
               <a:rPr lang="en-IN" smtClean="0"/>
-              <a:t>30-04-2023</a:t>
+              <a:t>15-06-2023</a:t>
             </a:fld>
             <a:endParaRPr lang="en-IN"/>
           </a:p>
@@ -871,7 +914,7 @@
           <a:p>
             <a:fld id="{30317E40-9B5E-4799-9011-56979081E450}" type="datetimeFigureOut">
               <a:rPr lang="en-IN" smtClean="0"/>
-              <a:t>30-04-2023</a:t>
+              <a:t>15-06-2023</a:t>
             </a:fld>
             <a:endParaRPr lang="en-IN"/>
           </a:p>
@@ -1147,7 +1190,7 @@
           <a:p>
             <a:fld id="{30317E40-9B5E-4799-9011-56979081E450}" type="datetimeFigureOut">
               <a:rPr lang="en-IN" smtClean="0"/>
-              <a:t>30-04-2023</a:t>
+              <a:t>15-06-2023</a:t>
             </a:fld>
             <a:endParaRPr lang="en-IN"/>
           </a:p>
@@ -1415,7 +1458,7 @@
           <a:p>
             <a:fld id="{30317E40-9B5E-4799-9011-56979081E450}" type="datetimeFigureOut">
               <a:rPr lang="en-IN" smtClean="0"/>
-              <a:t>30-04-2023</a:t>
+              <a:t>15-06-2023</a:t>
             </a:fld>
             <a:endParaRPr lang="en-IN"/>
           </a:p>
@@ -1830,7 +1873,7 @@
           <a:p>
             <a:fld id="{30317E40-9B5E-4799-9011-56979081E450}" type="datetimeFigureOut">
               <a:rPr lang="en-IN" smtClean="0"/>
-              <a:t>30-04-2023</a:t>
+              <a:t>15-06-2023</a:t>
             </a:fld>
             <a:endParaRPr lang="en-IN"/>
           </a:p>
@@ -1972,7 +2015,7 @@
           <a:p>
             <a:fld id="{30317E40-9B5E-4799-9011-56979081E450}" type="datetimeFigureOut">
               <a:rPr lang="en-IN" smtClean="0"/>
-              <a:t>30-04-2023</a:t>
+              <a:t>15-06-2023</a:t>
             </a:fld>
             <a:endParaRPr lang="en-IN"/>
           </a:p>
@@ -2085,7 +2128,7 @@
           <a:p>
             <a:fld id="{30317E40-9B5E-4799-9011-56979081E450}" type="datetimeFigureOut">
               <a:rPr lang="en-IN" smtClean="0"/>
-              <a:t>30-04-2023</a:t>
+              <a:t>15-06-2023</a:t>
             </a:fld>
             <a:endParaRPr lang="en-IN"/>
           </a:p>
@@ -2398,7 +2441,7 @@
           <a:p>
             <a:fld id="{30317E40-9B5E-4799-9011-56979081E450}" type="datetimeFigureOut">
               <a:rPr lang="en-IN" smtClean="0"/>
-              <a:t>30-04-2023</a:t>
+              <a:t>15-06-2023</a:t>
             </a:fld>
             <a:endParaRPr lang="en-IN"/>
           </a:p>
@@ -2687,7 +2730,7 @@
           <a:p>
             <a:fld id="{30317E40-9B5E-4799-9011-56979081E450}" type="datetimeFigureOut">
               <a:rPr lang="en-IN" smtClean="0"/>
-              <a:t>30-04-2023</a:t>
+              <a:t>15-06-2023</a:t>
             </a:fld>
             <a:endParaRPr lang="en-IN"/>
           </a:p>
@@ -2930,7 +2973,7 @@
           <a:p>
             <a:fld id="{30317E40-9B5E-4799-9011-56979081E450}" type="datetimeFigureOut">
               <a:rPr lang="en-IN" smtClean="0"/>
-              <a:t>30-04-2023</a:t>
+              <a:t>15-06-2023</a:t>
             </a:fld>
             <a:endParaRPr lang="en-IN"/>
           </a:p>
@@ -3436,7 +3479,7 @@
           <p:cNvPr id="2" name="Title 1">
             <a:extLst>
               <a:ext uri="{FF2B5EF4-FFF2-40B4-BE49-F238E27FC236}">
-                <a16:creationId xmlns:a16="http://schemas.microsoft.com/office/drawing/2014/main" id="{B05DC3D8-A12C-2010-874C-ECDDBC3E2338}"/>
+                <a16:creationId xmlns:a16="http://schemas.microsoft.com/office/drawing/2014/main" id="{FC77A7C7-B2FF-EBF7-632C-663A8107204B}"/>
               </a:ext>
             </a:extLst>
           </p:cNvPr>
@@ -3454,9 +3497,9 @@
           <a:p>
             <a:r>
               <a:rPr lang="en-GB" dirty="0"/>
-              <a:t>Explain Liner Regression model</a:t>
-            </a:r>
-            <a:endParaRPr lang="en-IN" dirty="0"/>
+              <a:t>Liner Regression Model</a:t>
+            </a:r>
+            <a:endParaRPr lang="en-US" dirty="0"/>
           </a:p>
         </p:txBody>
       </p:sp>
@@ -3465,7 +3508,7 @@
           <p:cNvPr id="3" name="Content Placeholder 2">
             <a:extLst>
               <a:ext uri="{FF2B5EF4-FFF2-40B4-BE49-F238E27FC236}">
-                <a16:creationId xmlns:a16="http://schemas.microsoft.com/office/drawing/2014/main" id="{0F0A57FB-4DD8-D2DF-CCB0-7BD5AA5CB643}"/>
+                <a16:creationId xmlns:a16="http://schemas.microsoft.com/office/drawing/2014/main" id="{8EE6C288-01AC-2561-94A5-9A597F23FCA9}"/>
               </a:ext>
             </a:extLst>
           </p:cNvPr>
@@ -3478,9 +3521,7 @@
         </p:nvSpPr>
         <p:spPr/>
         <p:txBody>
-          <a:bodyPr>
-            <a:normAutofit fontScale="70000" lnSpcReduction="20000"/>
-          </a:bodyPr>
+          <a:bodyPr/>
           <a:lstStyle/>
           <a:p>
             <a:pPr algn="l"/>
@@ -3492,7 +3533,7 @@
                 <a:effectLst/>
                 <a:latin typeface="Söhne"/>
               </a:rPr>
-              <a:t>Imagine you have a bunch of different sizes of watermelons, and you want to know how the weight of a watermelon is related to its size. You collect data by measuring the size (in </a:t>
+              <a:t>Linear regression is a statistical </a:t>
             </a:r>
             <a:r>
               <a:rPr lang="en-GB" b="0" i="0" dirty="0" err="1">
@@ -3502,7 +3543,7 @@
                 <a:effectLst/>
                 <a:latin typeface="Söhne"/>
               </a:rPr>
-              <a:t>centimeters</a:t>
+              <a:t>modeling</a:t>
             </a:r>
             <a:r>
               <a:rPr lang="en-GB" b="0" i="0" dirty="0">
@@ -3512,7 +3553,7 @@
                 <a:effectLst/>
                 <a:latin typeface="Söhne"/>
               </a:rPr>
-              <a:t>) and weight (in kilograms) of several watermelons.</a:t>
+              <a:t> technique used to understand the relationship between a dependent variable and one or more independent variables. It is called "linear" regression because it assumes a linear relationship between the independent variables and the dependent variable.</a:t>
             </a:r>
           </a:p>
           <a:p>
@@ -3525,73 +3566,18 @@
                 <a:effectLst/>
                 <a:latin typeface="Söhne"/>
               </a:rPr>
-              <a:t>You plot the data on a graph, with the size on the x-axis and the weight on the y-axis. Then, you draw a straight line that best fits the data points. This line is the regression line.</a:t>
-            </a:r>
-          </a:p>
-          <a:p>
-            <a:pPr algn="l"/>
-            <a:r>
-              <a:rPr lang="en-GB" b="0" i="0" dirty="0">
-                <a:solidFill>
-                  <a:srgbClr val="374151"/>
-                </a:solidFill>
-                <a:effectLst/>
-                <a:latin typeface="Söhne"/>
-              </a:rPr>
-              <a:t>The regression line helps you estimate the weight of a watermelon based on its size. So, if you measure the size of a new watermelon, you can use the regression line to predict its weight.</a:t>
-            </a:r>
-          </a:p>
-          <a:p>
-            <a:pPr algn="l"/>
-            <a:r>
-              <a:rPr lang="en-GB" b="0" i="0" dirty="0">
-                <a:solidFill>
-                  <a:srgbClr val="374151"/>
-                </a:solidFill>
-                <a:effectLst/>
-                <a:latin typeface="Söhne"/>
-              </a:rPr>
-              <a:t>Linear regression finds the equation for the regression line, which looks like this: weight = (slope × size) + intercept. The slope represents how steep the line is, and the intercept represents where the line crosses the y-axis.</a:t>
-            </a:r>
-          </a:p>
-          <a:p>
-            <a:pPr algn="l"/>
-            <a:r>
-              <a:rPr lang="en-GB" b="0" i="0" dirty="0">
-                <a:solidFill>
-                  <a:srgbClr val="374151"/>
-                </a:solidFill>
-                <a:effectLst/>
-                <a:latin typeface="Söhne"/>
-              </a:rPr>
-              <a:t>By calculating the best values for the slope and intercept, linear regression finds the line that best fits the data and allows you to make weight predictions for watermelons of different sizes.</a:t>
-            </a:r>
-          </a:p>
-          <a:p>
-            <a:pPr algn="l"/>
-            <a:r>
-              <a:rPr lang="en-GB" b="0" i="0" dirty="0">
-                <a:solidFill>
-                  <a:srgbClr val="374151"/>
-                </a:solidFill>
-                <a:effectLst/>
-                <a:latin typeface="Söhne"/>
-              </a:rPr>
-              <a:t>I hope this shorter explanation helps you understand linear regression better!</a:t>
-            </a:r>
-          </a:p>
-          <a:p>
-            <a:pPr marL="0" indent="0">
-              <a:buNone/>
-            </a:pPr>
-            <a:endParaRPr lang="en-IN" dirty="0"/>
+              <a:t>In simple linear regression, there is only one independent variable and one dependent variable, and the relationship is represented by a straight line. The goal is to find the best-fitting line that minimizes the difference between the predicted values and the actual values of the dependent variable.</a:t>
+            </a:r>
+          </a:p>
+          <a:p>
+            <a:endParaRPr lang="en-US" dirty="0"/>
           </a:p>
         </p:txBody>
       </p:sp>
     </p:spTree>
     <p:extLst>
       <p:ext uri="{BB962C8B-B14F-4D97-AF65-F5344CB8AC3E}">
-        <p14:creationId xmlns:p14="http://schemas.microsoft.com/office/powerpoint/2010/main" val="3258234063"/>
+        <p14:creationId xmlns:p14="http://schemas.microsoft.com/office/powerpoint/2010/main" val="3422778736"/>
       </p:ext>
     </p:extLst>
   </p:cSld>
@@ -3623,7 +3609,7 @@
           <p:cNvPr id="2" name="Title 1">
             <a:extLst>
               <a:ext uri="{FF2B5EF4-FFF2-40B4-BE49-F238E27FC236}">
-                <a16:creationId xmlns:a16="http://schemas.microsoft.com/office/drawing/2014/main" id="{282F94BE-44AA-3407-ADEA-33BB4CA6ABA6}"/>
+                <a16:creationId xmlns:a16="http://schemas.microsoft.com/office/drawing/2014/main" id="{B05DC3D8-A12C-2010-874C-ECDDBC3E2338}"/>
               </a:ext>
             </a:extLst>
           </p:cNvPr>
@@ -3641,7 +3627,7 @@
           <a:p>
             <a:r>
               <a:rPr lang="en-GB" dirty="0"/>
-              <a:t>Assumption in Liner Regression model</a:t>
+              <a:t>Explain Liner Regression model</a:t>
             </a:r>
             <a:endParaRPr lang="en-IN" dirty="0"/>
           </a:p>
@@ -3652,7 +3638,7 @@
           <p:cNvPr id="3" name="Content Placeholder 2">
             <a:extLst>
               <a:ext uri="{FF2B5EF4-FFF2-40B4-BE49-F238E27FC236}">
-                <a16:creationId xmlns:a16="http://schemas.microsoft.com/office/drawing/2014/main" id="{E8B1A41F-D3ED-70B0-69F1-1B9646D52DE7}"/>
+                <a16:creationId xmlns:a16="http://schemas.microsoft.com/office/drawing/2014/main" id="{0F0A57FB-4DD8-D2DF-CCB0-7BD5AA5CB643}"/>
               </a:ext>
             </a:extLst>
           </p:cNvPr>
@@ -3666,14 +3652,11 @@
         <p:spPr/>
         <p:txBody>
           <a:bodyPr>
-            <a:normAutofit fontScale="85000" lnSpcReduction="20000"/>
+            <a:normAutofit fontScale="70000" lnSpcReduction="20000"/>
           </a:bodyPr>
           <a:lstStyle/>
           <a:p>
-            <a:pPr algn="l">
-              <a:buFont typeface="+mj-lt"/>
-              <a:buAutoNum type="arabicPeriod"/>
-            </a:pPr>
+            <a:pPr algn="l"/>
             <a:r>
               <a:rPr lang="en-GB" b="0" i="0" dirty="0">
                 <a:solidFill>
@@ -3682,14 +3665,18 @@
                 <a:effectLst/>
                 <a:latin typeface="Söhne"/>
               </a:rPr>
-              <a:t>Linearity: The relationship between the independent and dependent variables is assumed to be linear.</a:t>
-            </a:r>
-          </a:p>
-          <a:p>
-            <a:pPr algn="l">
-              <a:buFont typeface="+mj-lt"/>
-              <a:buAutoNum type="arabicPeriod"/>
-            </a:pPr>
+              <a:t>Imagine you have a bunch of different sizes of watermelons, and you want to know how the weight of a watermelon is related to its size. You collect data by measuring the size (in </a:t>
+            </a:r>
+            <a:r>
+              <a:rPr lang="en-GB" b="0" i="0" dirty="0" err="1">
+                <a:solidFill>
+                  <a:srgbClr val="374151"/>
+                </a:solidFill>
+                <a:effectLst/>
+                <a:latin typeface="Söhne"/>
+              </a:rPr>
+              <a:t>centimeters</a:t>
+            </a:r>
             <a:r>
               <a:rPr lang="en-GB" b="0" i="0" dirty="0">
                 <a:solidFill>
@@ -3698,14 +3685,11 @@
                 <a:effectLst/>
                 <a:latin typeface="Söhne"/>
               </a:rPr>
-              <a:t>Independence: The observations in the dataset are assumed to be independent.</a:t>
-            </a:r>
-          </a:p>
-          <a:p>
-            <a:pPr algn="l">
-              <a:buFont typeface="+mj-lt"/>
-              <a:buAutoNum type="arabicPeriod"/>
-            </a:pPr>
+              <a:t>) and weight (in kilograms) of several watermelons.</a:t>
+            </a:r>
+          </a:p>
+          <a:p>
+            <a:pPr algn="l"/>
             <a:r>
               <a:rPr lang="en-GB" b="0" i="0" dirty="0">
                 <a:solidFill>
@@ -3714,14 +3698,11 @@
                 <a:effectLst/>
                 <a:latin typeface="Söhne"/>
               </a:rPr>
-              <a:t>Homoscedasticity: The variance of the residuals is assumed to be constant across all levels of the independent variable(s).</a:t>
-            </a:r>
-          </a:p>
-          <a:p>
-            <a:pPr algn="l">
-              <a:buFont typeface="+mj-lt"/>
-              <a:buAutoNum type="arabicPeriod"/>
-            </a:pPr>
+              <a:t>You plot the data on a graph, with the size on the x-axis and the weight on the y-axis. Then, you draw a straight line that best fits the data points. This line is the regression line.</a:t>
+            </a:r>
+          </a:p>
+          <a:p>
+            <a:pPr algn="l"/>
             <a:r>
               <a:rPr lang="en-GB" b="0" i="0" dirty="0">
                 <a:solidFill>
@@ -3730,14 +3711,11 @@
                 <a:effectLst/>
                 <a:latin typeface="Söhne"/>
               </a:rPr>
-              <a:t>Normality: The residuals are assumed to be normally distributed.</a:t>
-            </a:r>
-          </a:p>
-          <a:p>
-            <a:pPr algn="l">
-              <a:buFont typeface="+mj-lt"/>
-              <a:buAutoNum type="arabicPeriod"/>
-            </a:pPr>
+              <a:t>The regression line helps you estimate the weight of a watermelon based on its size. So, if you measure the size of a new watermelon, you can use the regression line to predict its weight.</a:t>
+            </a:r>
+          </a:p>
+          <a:p>
+            <a:pPr algn="l"/>
             <a:r>
               <a:rPr lang="en-GB" b="0" i="0" dirty="0">
                 <a:solidFill>
@@ -3746,14 +3724,11 @@
                 <a:effectLst/>
                 <a:latin typeface="Söhne"/>
               </a:rPr>
-              <a:t>No multicollinearity: The independent variables should not be highly correlated with each other.</a:t>
-            </a:r>
-          </a:p>
-          <a:p>
-            <a:pPr algn="l">
-              <a:buFont typeface="+mj-lt"/>
-              <a:buAutoNum type="arabicPeriod"/>
-            </a:pPr>
+              <a:t>Linear regression finds the equation for the regression line, which looks like this: weight = (slope × size) + intercept. The slope represents how steep the line is, and the intercept represents where the line crosses the y-axis.</a:t>
+            </a:r>
+          </a:p>
+          <a:p>
+            <a:pPr algn="l"/>
             <a:r>
               <a:rPr lang="en-GB" b="0" i="0" dirty="0">
                 <a:solidFill>
@@ -3762,7 +3737,7 @@
                 <a:effectLst/>
                 <a:latin typeface="Söhne"/>
               </a:rPr>
-              <a:t>No endogeneity: There should be no reverse causality or feedback between the dependent and independent variables.</a:t>
+              <a:t>By calculating the best values for the slope and intercept, linear regression finds the line that best fits the data and allows you to make weight predictions for watermelons of different sizes.</a:t>
             </a:r>
           </a:p>
           <a:p>
@@ -3775,15 +3750,21 @@
                 <a:effectLst/>
                 <a:latin typeface="Söhne"/>
               </a:rPr>
-              <a:t>These assumptions help ensure the validity and reliability of the linear regression model.</a:t>
-            </a:r>
+              <a:t>I hope this shorter explanation helps you understand linear regression better!</a:t>
+            </a:r>
+          </a:p>
+          <a:p>
+            <a:pPr marL="0" indent="0">
+              <a:buNone/>
+            </a:pPr>
+            <a:endParaRPr lang="en-IN" dirty="0"/>
           </a:p>
         </p:txBody>
       </p:sp>
     </p:spTree>
     <p:extLst>
       <p:ext uri="{BB962C8B-B14F-4D97-AF65-F5344CB8AC3E}">
-        <p14:creationId xmlns:p14="http://schemas.microsoft.com/office/powerpoint/2010/main" val="3344326791"/>
+        <p14:creationId xmlns:p14="http://schemas.microsoft.com/office/powerpoint/2010/main" val="3258234063"/>
       </p:ext>
     </p:extLst>
   </p:cSld>
@@ -3815,7 +3796,7 @@
           <p:cNvPr id="2" name="Title 1">
             <a:extLst>
               <a:ext uri="{FF2B5EF4-FFF2-40B4-BE49-F238E27FC236}">
-                <a16:creationId xmlns:a16="http://schemas.microsoft.com/office/drawing/2014/main" id="{94AB187F-4EC3-9900-77F8-30076E63C501}"/>
+                <a16:creationId xmlns:a16="http://schemas.microsoft.com/office/drawing/2014/main" id="{282F94BE-44AA-3407-ADEA-33BB4CA6ABA6}"/>
               </a:ext>
             </a:extLst>
           </p:cNvPr>
@@ -3833,7 +3814,7 @@
           <a:p>
             <a:r>
               <a:rPr lang="en-GB" dirty="0"/>
-              <a:t>What is AUC curve ?</a:t>
+              <a:t>Assumption in Liner Regression model</a:t>
             </a:r>
             <a:endParaRPr lang="en-IN" dirty="0"/>
           </a:p>
@@ -3844,7 +3825,7 @@
           <p:cNvPr id="3" name="Content Placeholder 2">
             <a:extLst>
               <a:ext uri="{FF2B5EF4-FFF2-40B4-BE49-F238E27FC236}">
-                <a16:creationId xmlns:a16="http://schemas.microsoft.com/office/drawing/2014/main" id="{F776A82D-B3D2-C6FE-BB85-C766E63B75F0}"/>
+                <a16:creationId xmlns:a16="http://schemas.microsoft.com/office/drawing/2014/main" id="{E8B1A41F-D3ED-70B0-69F1-1B9646D52DE7}"/>
               </a:ext>
             </a:extLst>
           </p:cNvPr>
@@ -3857,9 +3838,15 @@
         </p:nvSpPr>
         <p:spPr/>
         <p:txBody>
-          <a:bodyPr/>
-          <a:lstStyle/>
-          <a:p>
+          <a:bodyPr>
+            <a:normAutofit fontScale="85000" lnSpcReduction="20000"/>
+          </a:bodyPr>
+          <a:lstStyle/>
+          <a:p>
+            <a:pPr algn="l">
+              <a:buFont typeface="+mj-lt"/>
+              <a:buAutoNum type="arabicPeriod"/>
+            </a:pPr>
             <a:r>
               <a:rPr lang="en-GB" b="0" i="0" dirty="0">
                 <a:solidFill>
@@ -3868,16 +3855,108 @@
                 <a:effectLst/>
                 <a:latin typeface="Söhne"/>
               </a:rPr>
-              <a:t>The AUC (Area Under the Curve) curve is a graphical representation used to evaluate the performance of a binary classification model. It plots the True Positive Rate against the False Positive Rate at different classification thresholds. The AUC value summarizes the model's ability to distinguish between positive and negative instances. A higher AUC indicates better performance, with 1 representing a perfect classifier and 0.5 representing random guessing. The AUC curve provides a visual assessment of the model's discrimination ability and can be used to compare different models.</a:t>
-            </a:r>
-            <a:endParaRPr lang="en-IN" dirty="0"/>
+              <a:t>Linearity: The relationship between the independent and dependent variables is assumed to be linear.</a:t>
+            </a:r>
+          </a:p>
+          <a:p>
+            <a:pPr algn="l">
+              <a:buFont typeface="+mj-lt"/>
+              <a:buAutoNum type="arabicPeriod"/>
+            </a:pPr>
+            <a:r>
+              <a:rPr lang="en-GB" b="0" i="0" dirty="0">
+                <a:solidFill>
+                  <a:srgbClr val="374151"/>
+                </a:solidFill>
+                <a:effectLst/>
+                <a:latin typeface="Söhne"/>
+              </a:rPr>
+              <a:t>Independence: The observations in the dataset are assumed to be independent.</a:t>
+            </a:r>
+          </a:p>
+          <a:p>
+            <a:pPr algn="l">
+              <a:buFont typeface="+mj-lt"/>
+              <a:buAutoNum type="arabicPeriod"/>
+            </a:pPr>
+            <a:r>
+              <a:rPr lang="en-GB" b="0" i="0" dirty="0">
+                <a:solidFill>
+                  <a:srgbClr val="374151"/>
+                </a:solidFill>
+                <a:effectLst/>
+                <a:latin typeface="Söhne"/>
+              </a:rPr>
+              <a:t>Homoscedasticity: The variance of the residuals is assumed to be constant across all levels of the independent variable(s).</a:t>
+            </a:r>
+          </a:p>
+          <a:p>
+            <a:pPr algn="l">
+              <a:buFont typeface="+mj-lt"/>
+              <a:buAutoNum type="arabicPeriod"/>
+            </a:pPr>
+            <a:r>
+              <a:rPr lang="en-GB" b="0" i="0" dirty="0">
+                <a:solidFill>
+                  <a:srgbClr val="374151"/>
+                </a:solidFill>
+                <a:effectLst/>
+                <a:latin typeface="Söhne"/>
+              </a:rPr>
+              <a:t>Normality: The residuals are assumed to be normally distributed.</a:t>
+            </a:r>
+          </a:p>
+          <a:p>
+            <a:pPr algn="l">
+              <a:buFont typeface="+mj-lt"/>
+              <a:buAutoNum type="arabicPeriod"/>
+            </a:pPr>
+            <a:r>
+              <a:rPr lang="en-GB" b="0" i="0" dirty="0">
+                <a:solidFill>
+                  <a:srgbClr val="374151"/>
+                </a:solidFill>
+                <a:effectLst/>
+                <a:latin typeface="Söhne"/>
+              </a:rPr>
+              <a:t>No multicollinearity: The independent variables should not be highly correlated with each other.</a:t>
+            </a:r>
+          </a:p>
+          <a:p>
+            <a:pPr algn="l">
+              <a:buFont typeface="+mj-lt"/>
+              <a:buAutoNum type="arabicPeriod"/>
+            </a:pPr>
+            <a:r>
+              <a:rPr lang="en-GB" b="0" i="0" dirty="0">
+                <a:solidFill>
+                  <a:srgbClr val="374151"/>
+                </a:solidFill>
+                <a:effectLst/>
+                <a:latin typeface="Söhne"/>
+              </a:rPr>
+              <a:t>No endogeneity: There should be no reverse causality or feedback between the dependent and independent variables.</a:t>
+            </a:r>
+          </a:p>
+          <a:p>
+            <a:pPr algn="l"/>
+            <a:r>
+              <a:rPr lang="en-GB" b="0" i="0" dirty="0">
+                <a:solidFill>
+                  <a:srgbClr val="374151"/>
+                </a:solidFill>
+                <a:effectLst/>
+                <a:latin typeface="Söhne"/>
+              </a:rPr>
+              <a:t>These assumptions help ensure the validity and reliability of the linear regression model.</a:t>
+            </a:r>
           </a:p>
         </p:txBody>
       </p:sp>
     </p:spTree>
     <p:extLst>
       <p:ext uri="{BB962C8B-B14F-4D97-AF65-F5344CB8AC3E}">
-        <p14:creationId xmlns:p14="http://schemas.microsoft.com/office/powerpoint/2010/main" val="4130019013"/>
+        <p14:creationId xmlns:p14="http://schemas.microsoft.com/office/powerpoint/2010/main" val="3344326791"/>
       </p:ext>
     </p:extLst>
   </p:cSld>
@@ -3906,6 +3985,100 @@
       </p:grpSpPr>
       <p:sp>
         <p:nvSpPr>
+          <p:cNvPr id="2" name="Title 1">
+            <a:extLst>
+              <a:ext uri="{FF2B5EF4-FFF2-40B4-BE49-F238E27FC236}">
+                <a16:creationId xmlns:a16="http://schemas.microsoft.com/office/drawing/2014/main" id="{94AB187F-4EC3-9900-77F8-30076E63C501}"/>
+              </a:ext>
+            </a:extLst>
+          </p:cNvPr>
+          <p:cNvSpPr>
+            <a:spLocks noGrp="1"/>
+          </p:cNvSpPr>
+          <p:nvPr>
+            <p:ph type="title"/>
+          </p:nvPr>
+        </p:nvSpPr>
+        <p:spPr/>
+        <p:txBody>
+          <a:bodyPr/>
+          <a:lstStyle/>
+          <a:p>
+            <a:r>
+              <a:rPr lang="en-GB" dirty="0"/>
+              <a:t>What is AUC curve ?</a:t>
+            </a:r>
+            <a:endParaRPr lang="en-IN" dirty="0"/>
+          </a:p>
+        </p:txBody>
+      </p:sp>
+      <p:sp>
+        <p:nvSpPr>
+          <p:cNvPr id="3" name="Content Placeholder 2">
+            <a:extLst>
+              <a:ext uri="{FF2B5EF4-FFF2-40B4-BE49-F238E27FC236}">
+                <a16:creationId xmlns:a16="http://schemas.microsoft.com/office/drawing/2014/main" id="{F776A82D-B3D2-C6FE-BB85-C766E63B75F0}"/>
+              </a:ext>
+            </a:extLst>
+          </p:cNvPr>
+          <p:cNvSpPr>
+            <a:spLocks noGrp="1"/>
+          </p:cNvSpPr>
+          <p:nvPr>
+            <p:ph idx="1"/>
+          </p:nvPr>
+        </p:nvSpPr>
+        <p:spPr/>
+        <p:txBody>
+          <a:bodyPr/>
+          <a:lstStyle/>
+          <a:p>
+            <a:r>
+              <a:rPr lang="en-GB" b="0" i="0" dirty="0">
+                <a:solidFill>
+                  <a:srgbClr val="374151"/>
+                </a:solidFill>
+                <a:effectLst/>
+                <a:latin typeface="Söhne"/>
+              </a:rPr>
+              <a:t>The AUC (Area Under the Curve) curve is a graphical representation used to evaluate the performance of a binary classification model. It plots the True Positive Rate against the False Positive Rate at different classification thresholds. The AUC value summarizes the model's ability to distinguish between positive and negative instances. A higher AUC indicates better performance, with 1 representing a perfect classifier and 0.5 representing random guessing. The AUC curve provides a visual assessment of the model's discrimination ability and can be used to compare different models.</a:t>
+            </a:r>
+            <a:endParaRPr lang="en-IN" dirty="0"/>
+          </a:p>
+        </p:txBody>
+      </p:sp>
+    </p:spTree>
+    <p:extLst>
+      <p:ext uri="{BB962C8B-B14F-4D97-AF65-F5344CB8AC3E}">
+        <p14:creationId xmlns:p14="http://schemas.microsoft.com/office/powerpoint/2010/main" val="4130019013"/>
+      </p:ext>
+    </p:extLst>
+  </p:cSld>
+  <p:clrMapOvr>
+    <a:masterClrMapping/>
+  </p:clrMapOvr>
+</p:sld>
+</file>
+
+<file path=ppt/slides/slide6.xml><?xml version="1.0" encoding="utf-8"?>
+<p:sld xmlns:a="http://schemas.openxmlformats.org/drawingml/2006/main" xmlns:r="http://schemas.openxmlformats.org/officeDocument/2006/relationships" xmlns:p="http://schemas.openxmlformats.org/presentationml/2006/main">
+  <p:cSld>
+    <p:spTree>
+      <p:nvGrpSpPr>
+        <p:cNvPr id="1" name=""/>
+        <p:cNvGrpSpPr/>
+        <p:nvPr/>
+      </p:nvGrpSpPr>
+      <p:grpSpPr>
+        <a:xfrm>
+          <a:off x="0" y="0"/>
+          <a:ext cx="0" cy="0"/>
+          <a:chOff x="0" y="0"/>
+          <a:chExt cx="0" cy="0"/>
+        </a:xfrm>
+      </p:grpSpPr>
+      <p:sp>
+        <p:nvSpPr>
           <p:cNvPr id="3" name="Content Placeholder 2">
             <a:extLst>
               <a:ext uri="{FF2B5EF4-FFF2-40B4-BE49-F238E27FC236}">
@@ -4014,7 +4187,7 @@
 </p:sld>
 </file>
 
-<file path=ppt/slides/slide6.xml><?xml version="1.0" encoding="utf-8"?>
+<file path=ppt/slides/slide7.xml><?xml version="1.0" encoding="utf-8"?>
 <p:sld xmlns:a="http://schemas.openxmlformats.org/drawingml/2006/main" xmlns:r="http://schemas.openxmlformats.org/officeDocument/2006/relationships" xmlns:p="http://schemas.openxmlformats.org/presentationml/2006/main">
   <p:cSld>
     <p:spTree>

</xml_diff>